<commit_message>
final revision for project upload
</commit_message>
<xml_diff>
--- a/PowerPoint presentation.pptx
+++ b/PowerPoint presentation.pptx
@@ -220,7 +220,7 @@
           <a:p>
             <a:fld id="{FD9D2DDA-69D8-473F-A583-B6774B31A77B}" type="datetimeFigureOut">
               <a:rPr lang="en-US"/>
-              <a:t>3/14/2017</a:t>
+              <a:t>3/19/2017</a:t>
             </a:fld>
             <a:endParaRPr/>
           </a:p>
@@ -385,7 +385,7 @@
           <a:p>
             <a:fld id="{A01F6DFB-6833-46E4-B515-70E0D9178056}" type="datetimeFigureOut">
               <a:rPr lang="en-US"/>
-              <a:t>3/14/2017</a:t>
+              <a:t>3/19/2017</a:t>
             </a:fld>
             <a:endParaRPr/>
           </a:p>
@@ -964,7 +964,7 @@
           </a:lstStyle>
           <a:p>
             <a:r>
-              <a:rPr lang="en-US" smtClean="0"/>
+              <a:rPr lang="en-US"/>
               <a:t>Click to edit Master title style</a:t>
             </a:r>
             <a:endParaRPr/>
@@ -1034,7 +1034,7 @@
           </a:lstStyle>
           <a:p>
             <a:r>
-              <a:rPr lang="en-US" smtClean="0"/>
+              <a:rPr lang="en-US"/>
               <a:t>Click to edit Master subtitle style</a:t>
             </a:r>
             <a:endParaRPr/>
@@ -1063,13 +1063,6 @@
       </p:transition>
     </mc:Fallback>
   </mc:AlternateContent>
-  <p:timing>
-    <p:tnLst>
-      <p:par>
-        <p:cTn id="1" dur="indefinite" restart="never" nodeType="tmRoot"/>
-      </p:par>
-    </p:tnLst>
-  </p:timing>
 </p:sldLayout>
 </file>
 
@@ -1106,7 +1099,7 @@
           <a:lstStyle/>
           <a:p>
             <a:r>
-              <a:rPr lang="en-US" smtClean="0"/>
+              <a:rPr lang="en-US"/>
               <a:t>Click to edit Master title style</a:t>
             </a:r>
             <a:endParaRPr/>
@@ -1140,35 +1133,35 @@
           <a:p>
             <a:pPr lvl="0"/>
             <a:r>
-              <a:rPr lang="en-US" smtClean="0"/>
+              <a:rPr lang="en-US"/>
               <a:t>Edit Master text styles</a:t>
             </a:r>
           </a:p>
           <a:p>
             <a:pPr lvl="1"/>
             <a:r>
-              <a:rPr lang="en-US" smtClean="0"/>
+              <a:rPr lang="en-US"/>
               <a:t>Second level</a:t>
             </a:r>
           </a:p>
           <a:p>
             <a:pPr lvl="2"/>
             <a:r>
-              <a:rPr lang="en-US" smtClean="0"/>
+              <a:rPr lang="en-US"/>
               <a:t>Third level</a:t>
             </a:r>
           </a:p>
           <a:p>
             <a:pPr lvl="3"/>
             <a:r>
-              <a:rPr lang="en-US" smtClean="0"/>
+              <a:rPr lang="en-US"/>
               <a:t>Fourth level</a:t>
             </a:r>
           </a:p>
           <a:p>
             <a:pPr lvl="4"/>
             <a:r>
-              <a:rPr lang="en-US" smtClean="0"/>
+              <a:rPr lang="en-US"/>
               <a:t>Fifth level</a:t>
             </a:r>
             <a:endParaRPr/>
@@ -1192,7 +1185,7 @@
           <a:p>
             <a:fld id="{0B277187-C200-495F-A386-621319EADA8F}" type="datetimeFigureOut">
               <a:rPr lang="en-US"/>
-              <a:t>3/14/2017</a:t>
+              <a:t>3/19/2017</a:t>
             </a:fld>
             <a:endParaRPr/>
           </a:p>
@@ -1303,7 +1296,7 @@
           <a:lstStyle/>
           <a:p>
             <a:r>
-              <a:rPr lang="en-US" smtClean="0"/>
+              <a:rPr lang="en-US"/>
               <a:t>Click to edit Master title style</a:t>
             </a:r>
             <a:endParaRPr/>
@@ -1332,35 +1325,35 @@
           <a:p>
             <a:pPr lvl="0"/>
             <a:r>
-              <a:rPr lang="en-US" smtClean="0"/>
+              <a:rPr lang="en-US"/>
               <a:t>Edit Master text styles</a:t>
             </a:r>
           </a:p>
           <a:p>
             <a:pPr lvl="1"/>
             <a:r>
-              <a:rPr lang="en-US" smtClean="0"/>
+              <a:rPr lang="en-US"/>
               <a:t>Second level</a:t>
             </a:r>
           </a:p>
           <a:p>
             <a:pPr lvl="2"/>
             <a:r>
-              <a:rPr lang="en-US" smtClean="0"/>
+              <a:rPr lang="en-US"/>
               <a:t>Third level</a:t>
             </a:r>
           </a:p>
           <a:p>
             <a:pPr lvl="3"/>
             <a:r>
-              <a:rPr lang="en-US" smtClean="0"/>
+              <a:rPr lang="en-US"/>
               <a:t>Fourth level</a:t>
             </a:r>
           </a:p>
           <a:p>
             <a:pPr lvl="4"/>
             <a:r>
-              <a:rPr lang="en-US" smtClean="0"/>
+              <a:rPr lang="en-US"/>
               <a:t>Fifth level</a:t>
             </a:r>
             <a:endParaRPr/>
@@ -1384,7 +1377,7 @@
           <a:p>
             <a:fld id="{0B277187-C200-495F-A386-621319EADA8F}" type="datetimeFigureOut">
               <a:rPr lang="en-US"/>
-              <a:t>3/14/2017</a:t>
+              <a:t>3/19/2017</a:t>
             </a:fld>
             <a:endParaRPr/>
           </a:p>
@@ -1490,7 +1483,7 @@
           <a:lstStyle/>
           <a:p>
             <a:r>
-              <a:rPr lang="en-US" smtClean="0"/>
+              <a:rPr lang="en-US"/>
               <a:t>Click to edit Master title style</a:t>
             </a:r>
             <a:endParaRPr/>
@@ -1530,35 +1523,35 @@
           <a:p>
             <a:pPr lvl="0"/>
             <a:r>
-              <a:rPr lang="en-US" smtClean="0"/>
+              <a:rPr lang="en-US"/>
               <a:t>Edit Master text styles</a:t>
             </a:r>
           </a:p>
           <a:p>
             <a:pPr lvl="1"/>
             <a:r>
-              <a:rPr lang="en-US" smtClean="0"/>
+              <a:rPr lang="en-US"/>
               <a:t>Second level</a:t>
             </a:r>
           </a:p>
           <a:p>
             <a:pPr lvl="2"/>
             <a:r>
-              <a:rPr lang="en-US" smtClean="0"/>
+              <a:rPr lang="en-US"/>
               <a:t>Third level</a:t>
             </a:r>
           </a:p>
           <a:p>
             <a:pPr lvl="3"/>
             <a:r>
-              <a:rPr lang="en-US" smtClean="0"/>
+              <a:rPr lang="en-US"/>
               <a:t>Fourth level</a:t>
             </a:r>
           </a:p>
           <a:p>
             <a:pPr lvl="4"/>
             <a:r>
-              <a:rPr lang="en-US" smtClean="0"/>
+              <a:rPr lang="en-US"/>
               <a:t>Fifth level</a:t>
             </a:r>
             <a:endParaRPr dirty="0"/>
@@ -1582,7 +1575,7 @@
           <a:p>
             <a:fld id="{0B277187-C200-495F-A386-621319EADA8F}" type="datetimeFigureOut">
               <a:rPr lang="en-US"/>
-              <a:t>3/14/2017</a:t>
+              <a:t>3/19/2017</a:t>
             </a:fld>
             <a:endParaRPr/>
           </a:p>
@@ -1652,13 +1645,6 @@
       </p:transition>
     </mc:Fallback>
   </mc:AlternateContent>
-  <p:timing>
-    <p:tnLst>
-      <p:par>
-        <p:cTn id="1" dur="indefinite" restart="never" nodeType="tmRoot"/>
-      </p:par>
-    </p:tnLst>
-  </p:timing>
   <p:extLst>
     <p:ext uri="{DCECCB84-F9BA-43D5-87BE-67443E8EF086}">
       <p15:sldGuideLst xmlns:p15="http://schemas.microsoft.com/office/powerpoint/2012/main">
@@ -1746,7 +1732,7 @@
           </a:lstStyle>
           <a:p>
             <a:r>
-              <a:rPr lang="en-US" smtClean="0"/>
+              <a:rPr lang="en-US"/>
               <a:t>Click to edit Master title style</a:t>
             </a:r>
             <a:endParaRPr/>
@@ -1870,7 +1856,7 @@
           <a:p>
             <a:pPr lvl="0"/>
             <a:r>
-              <a:rPr lang="en-US" smtClean="0"/>
+              <a:rPr lang="en-US"/>
               <a:t>Edit Master text styles</a:t>
             </a:r>
           </a:p>
@@ -1893,7 +1879,7 @@
           <a:p>
             <a:fld id="{0B277187-C200-495F-A386-621319EADA8F}" type="datetimeFigureOut">
               <a:rPr lang="en-US"/>
-              <a:t>3/14/2017</a:t>
+              <a:t>3/19/2017</a:t>
             </a:fld>
             <a:endParaRPr/>
           </a:p>
@@ -1999,7 +1985,7 @@
           <a:lstStyle/>
           <a:p>
             <a:r>
-              <a:rPr lang="en-US" smtClean="0"/>
+              <a:rPr lang="en-US"/>
               <a:t>Click to edit Master title style</a:t>
             </a:r>
             <a:endParaRPr/>
@@ -2058,35 +2044,35 @@
           <a:p>
             <a:pPr lvl="0"/>
             <a:r>
-              <a:rPr lang="en-US" smtClean="0"/>
+              <a:rPr lang="en-US"/>
               <a:t>Edit Master text styles</a:t>
             </a:r>
           </a:p>
           <a:p>
             <a:pPr lvl="1"/>
             <a:r>
-              <a:rPr lang="en-US" smtClean="0"/>
+              <a:rPr lang="en-US"/>
               <a:t>Second level</a:t>
             </a:r>
           </a:p>
           <a:p>
             <a:pPr lvl="2"/>
             <a:r>
-              <a:rPr lang="en-US" smtClean="0"/>
+              <a:rPr lang="en-US"/>
               <a:t>Third level</a:t>
             </a:r>
           </a:p>
           <a:p>
             <a:pPr lvl="3"/>
             <a:r>
-              <a:rPr lang="en-US" smtClean="0"/>
+              <a:rPr lang="en-US"/>
               <a:t>Fourth level</a:t>
             </a:r>
           </a:p>
           <a:p>
             <a:pPr lvl="4"/>
             <a:r>
-              <a:rPr lang="en-US" smtClean="0"/>
+              <a:rPr lang="en-US"/>
               <a:t>Fifth level</a:t>
             </a:r>
             <a:endParaRPr/>
@@ -2145,35 +2131,35 @@
           <a:p>
             <a:pPr lvl="0"/>
             <a:r>
-              <a:rPr lang="en-US" smtClean="0"/>
+              <a:rPr lang="en-US"/>
               <a:t>Edit Master text styles</a:t>
             </a:r>
           </a:p>
           <a:p>
             <a:pPr lvl="1"/>
             <a:r>
-              <a:rPr lang="en-US" smtClean="0"/>
+              <a:rPr lang="en-US"/>
               <a:t>Second level</a:t>
             </a:r>
           </a:p>
           <a:p>
             <a:pPr lvl="2"/>
             <a:r>
-              <a:rPr lang="en-US" smtClean="0"/>
+              <a:rPr lang="en-US"/>
               <a:t>Third level</a:t>
             </a:r>
           </a:p>
           <a:p>
             <a:pPr lvl="3"/>
             <a:r>
-              <a:rPr lang="en-US" smtClean="0"/>
+              <a:rPr lang="en-US"/>
               <a:t>Fourth level</a:t>
             </a:r>
           </a:p>
           <a:p>
             <a:pPr lvl="4"/>
             <a:r>
-              <a:rPr lang="en-US" smtClean="0"/>
+              <a:rPr lang="en-US"/>
               <a:t>Fifth level</a:t>
             </a:r>
             <a:endParaRPr/>
@@ -2197,7 +2183,7 @@
           <a:p>
             <a:fld id="{0B277187-C200-495F-A386-621319EADA8F}" type="datetimeFigureOut">
               <a:rPr lang="en-US"/>
-              <a:t>3/14/2017</a:t>
+              <a:t>3/19/2017</a:t>
             </a:fld>
             <a:endParaRPr/>
           </a:p>
@@ -2303,7 +2289,7 @@
           <a:lstStyle/>
           <a:p>
             <a:r>
-              <a:rPr lang="en-US" smtClean="0"/>
+              <a:rPr lang="en-US"/>
               <a:t>Click to edit Master title style</a:t>
             </a:r>
             <a:endParaRPr/>
@@ -2378,7 +2364,7 @@
           <a:p>
             <a:pPr lvl="0"/>
             <a:r>
-              <a:rPr lang="en-US" smtClean="0"/>
+              <a:rPr lang="en-US"/>
               <a:t>Edit Master text styles</a:t>
             </a:r>
           </a:p>
@@ -2436,35 +2422,35 @@
           <a:p>
             <a:pPr lvl="0"/>
             <a:r>
-              <a:rPr lang="en-US" smtClean="0"/>
+              <a:rPr lang="en-US"/>
               <a:t>Edit Master text styles</a:t>
             </a:r>
           </a:p>
           <a:p>
             <a:pPr lvl="1"/>
             <a:r>
-              <a:rPr lang="en-US" smtClean="0"/>
+              <a:rPr lang="en-US"/>
               <a:t>Second level</a:t>
             </a:r>
           </a:p>
           <a:p>
             <a:pPr lvl="2"/>
             <a:r>
-              <a:rPr lang="en-US" smtClean="0"/>
+              <a:rPr lang="en-US"/>
               <a:t>Third level</a:t>
             </a:r>
           </a:p>
           <a:p>
             <a:pPr lvl="3"/>
             <a:r>
-              <a:rPr lang="en-US" smtClean="0"/>
+              <a:rPr lang="en-US"/>
               <a:t>Fourth level</a:t>
             </a:r>
           </a:p>
           <a:p>
             <a:pPr lvl="4"/>
             <a:r>
-              <a:rPr lang="en-US" smtClean="0"/>
+              <a:rPr lang="en-US"/>
               <a:t>Fifth level</a:t>
             </a:r>
             <a:endParaRPr/>
@@ -2539,7 +2525,7 @@
           <a:p>
             <a:pPr lvl="0"/>
             <a:r>
-              <a:rPr lang="en-US" smtClean="0"/>
+              <a:rPr lang="en-US"/>
               <a:t>Edit Master text styles</a:t>
             </a:r>
           </a:p>
@@ -2597,35 +2583,35 @@
           <a:p>
             <a:pPr lvl="0"/>
             <a:r>
-              <a:rPr lang="en-US" smtClean="0"/>
+              <a:rPr lang="en-US"/>
               <a:t>Edit Master text styles</a:t>
             </a:r>
           </a:p>
           <a:p>
             <a:pPr lvl="1"/>
             <a:r>
-              <a:rPr lang="en-US" smtClean="0"/>
+              <a:rPr lang="en-US"/>
               <a:t>Second level</a:t>
             </a:r>
           </a:p>
           <a:p>
             <a:pPr lvl="2"/>
             <a:r>
-              <a:rPr lang="en-US" smtClean="0"/>
+              <a:rPr lang="en-US"/>
               <a:t>Third level</a:t>
             </a:r>
           </a:p>
           <a:p>
             <a:pPr lvl="3"/>
             <a:r>
-              <a:rPr lang="en-US" smtClean="0"/>
+              <a:rPr lang="en-US"/>
               <a:t>Fourth level</a:t>
             </a:r>
           </a:p>
           <a:p>
             <a:pPr lvl="4"/>
             <a:r>
-              <a:rPr lang="en-US" smtClean="0"/>
+              <a:rPr lang="en-US"/>
               <a:t>Fifth level</a:t>
             </a:r>
             <a:endParaRPr/>
@@ -2649,7 +2635,7 @@
           <a:p>
             <a:fld id="{0B277187-C200-495F-A386-621319EADA8F}" type="datetimeFigureOut">
               <a:rPr lang="en-US"/>
-              <a:t>3/14/2017</a:t>
+              <a:t>3/19/2017</a:t>
             </a:fld>
             <a:endParaRPr/>
           </a:p>
@@ -2719,13 +2705,6 @@
       </p:transition>
     </mc:Fallback>
   </mc:AlternateContent>
-  <p:timing>
-    <p:tnLst>
-      <p:par>
-        <p:cTn id="1" dur="indefinite" restart="never" nodeType="tmRoot"/>
-      </p:par>
-    </p:tnLst>
-  </p:timing>
 </p:sldLayout>
 </file>
 
@@ -2762,7 +2741,7 @@
           <a:lstStyle/>
           <a:p>
             <a:r>
-              <a:rPr lang="en-US" smtClean="0"/>
+              <a:rPr lang="en-US"/>
               <a:t>Click to edit Master title style</a:t>
             </a:r>
             <a:endParaRPr/>
@@ -2786,7 +2765,7 @@
           <a:p>
             <a:fld id="{0B277187-C200-495F-A386-621319EADA8F}" type="datetimeFigureOut">
               <a:rPr lang="en-US"/>
-              <a:t>3/14/2017</a:t>
+              <a:t>3/19/2017</a:t>
             </a:fld>
             <a:endParaRPr/>
           </a:p>
@@ -3032,7 +3011,7 @@
           <a:p>
             <a:fld id="{0B277187-C200-495F-A386-621319EADA8F}" type="datetimeFigureOut">
               <a:rPr lang="en-US"/>
-              <a:t>3/14/2017</a:t>
+              <a:t>3/19/2017</a:t>
             </a:fld>
             <a:endParaRPr/>
           </a:p>
@@ -3288,7 +3267,7 @@
           </a:lstStyle>
           <a:p>
             <a:r>
-              <a:rPr lang="en-US" smtClean="0"/>
+              <a:rPr lang="en-US"/>
               <a:t>Click to edit Master title style</a:t>
             </a:r>
             <a:endParaRPr/>
@@ -3347,35 +3326,35 @@
           <a:p>
             <a:pPr lvl="0"/>
             <a:r>
-              <a:rPr lang="en-US" smtClean="0"/>
+              <a:rPr lang="en-US"/>
               <a:t>Edit Master text styles</a:t>
             </a:r>
           </a:p>
           <a:p>
             <a:pPr lvl="1"/>
             <a:r>
-              <a:rPr lang="en-US" smtClean="0"/>
+              <a:rPr lang="en-US"/>
               <a:t>Second level</a:t>
             </a:r>
           </a:p>
           <a:p>
             <a:pPr lvl="2"/>
             <a:r>
-              <a:rPr lang="en-US" smtClean="0"/>
+              <a:rPr lang="en-US"/>
               <a:t>Third level</a:t>
             </a:r>
           </a:p>
           <a:p>
             <a:pPr lvl="3"/>
             <a:r>
-              <a:rPr lang="en-US" smtClean="0"/>
+              <a:rPr lang="en-US"/>
               <a:t>Fourth level</a:t>
             </a:r>
           </a:p>
           <a:p>
             <a:pPr lvl="4"/>
             <a:r>
-              <a:rPr lang="en-US" smtClean="0"/>
+              <a:rPr lang="en-US"/>
               <a:t>Fifth level</a:t>
             </a:r>
             <a:endParaRPr/>
@@ -3446,7 +3425,7 @@
           <a:p>
             <a:pPr lvl="0"/>
             <a:r>
-              <a:rPr lang="en-US" smtClean="0"/>
+              <a:rPr lang="en-US"/>
               <a:t>Edit Master text styles</a:t>
             </a:r>
           </a:p>
@@ -3469,7 +3448,7 @@
           <a:p>
             <a:fld id="{0B277187-C200-495F-A386-621319EADA8F}" type="datetimeFigureOut">
               <a:rPr lang="en-US"/>
-              <a:t>3/14/2017</a:t>
+              <a:t>3/19/2017</a:t>
             </a:fld>
             <a:endParaRPr/>
           </a:p>
@@ -3725,7 +3704,7 @@
           </a:lstStyle>
           <a:p>
             <a:r>
-              <a:rPr lang="en-US" smtClean="0"/>
+              <a:rPr lang="en-US"/>
               <a:t>Click to edit Master title style</a:t>
             </a:r>
             <a:endParaRPr/>
@@ -3798,7 +3777,7 @@
           </a:lstStyle>
           <a:p>
             <a:r>
-              <a:rPr lang="en-US" smtClean="0"/>
+              <a:rPr lang="en-US"/>
               <a:t>Click icon to add picture</a:t>
             </a:r>
             <a:endParaRPr/>
@@ -3869,7 +3848,7 @@
           <a:p>
             <a:pPr lvl="0"/>
             <a:r>
-              <a:rPr lang="en-US" smtClean="0"/>
+              <a:rPr lang="en-US"/>
               <a:t>Edit Master text styles</a:t>
             </a:r>
           </a:p>
@@ -3892,7 +3871,7 @@
           <a:p>
             <a:fld id="{0B277187-C200-495F-A386-621319EADA8F}" type="datetimeFigureOut">
               <a:rPr lang="en-US"/>
-              <a:t>3/14/2017</a:t>
+              <a:t>3/19/2017</a:t>
             </a:fld>
             <a:endParaRPr/>
           </a:p>
@@ -4179,7 +4158,7 @@
           <a:lstStyle/>
           <a:p>
             <a:r>
-              <a:rPr lang="en-US" smtClean="0"/>
+              <a:rPr lang="en-US"/>
               <a:t>Click to edit Master title style</a:t>
             </a:r>
             <a:endParaRPr/>
@@ -4213,35 +4192,35 @@
           <a:p>
             <a:pPr lvl="0"/>
             <a:r>
-              <a:rPr lang="en-US" smtClean="0"/>
+              <a:rPr lang="en-US"/>
               <a:t>Edit Master text styles</a:t>
             </a:r>
           </a:p>
           <a:p>
             <a:pPr lvl="1"/>
             <a:r>
-              <a:rPr lang="en-US" smtClean="0"/>
+              <a:rPr lang="en-US"/>
               <a:t>Second level</a:t>
             </a:r>
           </a:p>
           <a:p>
             <a:pPr lvl="2"/>
             <a:r>
-              <a:rPr lang="en-US" smtClean="0"/>
+              <a:rPr lang="en-US"/>
               <a:t>Third level</a:t>
             </a:r>
           </a:p>
           <a:p>
             <a:pPr lvl="3"/>
             <a:r>
-              <a:rPr lang="en-US" smtClean="0"/>
+              <a:rPr lang="en-US"/>
               <a:t>Fourth level</a:t>
             </a:r>
           </a:p>
           <a:p>
             <a:pPr lvl="4"/>
             <a:r>
-              <a:rPr lang="en-US" smtClean="0"/>
+              <a:rPr lang="en-US"/>
               <a:t>Fifth level</a:t>
             </a:r>
             <a:endParaRPr dirty="0"/>
@@ -4282,7 +4261,7 @@
             <a:fld id="{0B277187-C200-495F-A386-621319EADA8F}" type="datetimeFigureOut">
               <a:rPr lang="en-US"/>
               <a:pPr/>
-              <a:t>3/14/2017</a:t>
+              <a:t>3/19/2017</a:t>
             </a:fld>
             <a:endParaRPr/>
           </a:p>
@@ -4396,13 +4375,6 @@
       </p:transition>
     </mc:Fallback>
   </mc:AlternateContent>
-  <p:timing>
-    <p:tnLst>
-      <p:par>
-        <p:cTn id="1" dur="indefinite" restart="never" nodeType="tmRoot"/>
-      </p:par>
-    </p:tnLst>
-  </p:timing>
   <p:txStyles>
     <p:titleStyle>
       <a:lvl1pPr algn="l" defTabSz="914400" rtl="0" eaLnBrk="1" latinLnBrk="0" hangingPunct="1">
@@ -4759,10 +4731,9 @@
           <a:lstStyle/>
           <a:p>
             <a:r>
-              <a:rPr lang="en-US" dirty="0" smtClean="0"/>
+              <a:rPr lang="en-US" dirty="0"/>
               <a:t>Audio Acoustic Assistant</a:t>
             </a:r>
-            <a:endParaRPr lang="en-US" dirty="0"/>
           </a:p>
         </p:txBody>
       </p:sp>
@@ -4784,20 +4755,20 @@
           <a:lstStyle/>
           <a:p>
             <a:r>
-              <a:rPr lang="en-US" smtClean="0"/>
+              <a:rPr lang="en-US"/>
               <a:t>Mid-Point </a:t>
             </a:r>
             <a:r>
-              <a:rPr lang="en-US" dirty="0" smtClean="0"/>
+              <a:rPr lang="en-US" dirty="0"/>
               <a:t>Presentation</a:t>
             </a:r>
           </a:p>
           <a:p>
-            <a:endParaRPr lang="en-US" dirty="0" smtClean="0"/>
-          </a:p>
-          <a:p>
-            <a:r>
-              <a:rPr lang="en-US" dirty="0" smtClean="0"/>
+            <a:endParaRPr lang="en-US" dirty="0"/>
+          </a:p>
+          <a:p>
+            <a:r>
+              <a:rPr lang="en-US" dirty="0"/>
               <a:t>Group 14</a:t>
             </a:r>
           </a:p>
@@ -4825,13 +4796,6 @@
       </p:transition>
     </mc:Fallback>
   </mc:AlternateContent>
-  <p:timing>
-    <p:tnLst>
-      <p:par>
-        <p:cTn id="1" dur="indefinite" restart="never" nodeType="tmRoot"/>
-      </p:par>
-    </p:tnLst>
-  </p:timing>
 </p:sld>
 </file>
 
@@ -4868,10 +4832,9 @@
           <a:lstStyle/>
           <a:p>
             <a:r>
-              <a:rPr lang="en-US" dirty="0" smtClean="0"/>
+              <a:rPr lang="en-US" dirty="0"/>
               <a:t>Introduction</a:t>
             </a:r>
-            <a:endParaRPr lang="en-US" dirty="0"/>
           </a:p>
         </p:txBody>
       </p:sp>
@@ -4891,65 +4854,64 @@
           <a:lstStyle/>
           <a:p>
             <a:r>
-              <a:rPr lang="en-US" dirty="0" smtClean="0"/>
+              <a:rPr lang="en-US" dirty="0"/>
               <a:t>What is Audio Acoustic Assistant?</a:t>
             </a:r>
           </a:p>
           <a:p>
             <a:pPr lvl="1"/>
             <a:r>
-              <a:rPr lang="en-US" dirty="0" smtClean="0"/>
+              <a:rPr lang="en-US" dirty="0"/>
               <a:t>The idea</a:t>
             </a:r>
           </a:p>
           <a:p>
             <a:pPr lvl="1"/>
             <a:r>
-              <a:rPr lang="en-US" dirty="0" smtClean="0"/>
+              <a:rPr lang="en-US" dirty="0"/>
               <a:t>What it is all about</a:t>
             </a:r>
           </a:p>
           <a:p>
             <a:r>
-              <a:rPr lang="en-US" dirty="0" smtClean="0"/>
+              <a:rPr lang="en-US" dirty="0"/>
               <a:t>The feasibility of the app</a:t>
             </a:r>
           </a:p>
           <a:p>
             <a:pPr lvl="1"/>
             <a:r>
-              <a:rPr lang="en-US" dirty="0" smtClean="0"/>
+              <a:rPr lang="en-US" dirty="0"/>
               <a:t>Who is it made for?</a:t>
             </a:r>
           </a:p>
           <a:p>
             <a:pPr lvl="1"/>
             <a:r>
-              <a:rPr lang="en-US" dirty="0" smtClean="0"/>
+              <a:rPr lang="en-US" dirty="0"/>
               <a:t>Why is it being made?</a:t>
             </a:r>
           </a:p>
           <a:p>
             <a:pPr lvl="1"/>
             <a:r>
-              <a:rPr lang="en-US" dirty="0" smtClean="0"/>
+              <a:rPr lang="en-US" dirty="0"/>
               <a:t>What is the market?</a:t>
             </a:r>
           </a:p>
           <a:p>
             <a:pPr lvl="1"/>
             <a:r>
-              <a:rPr lang="en-US" dirty="0" smtClean="0"/>
+              <a:rPr lang="en-US" dirty="0"/>
               <a:t>Why is it important?</a:t>
             </a:r>
           </a:p>
           <a:p>
             <a:pPr lvl="1"/>
             <a:r>
-              <a:rPr lang="en-US" dirty="0" smtClean="0"/>
+              <a:rPr lang="en-US" dirty="0"/>
               <a:t>How will it be implemented?</a:t>
             </a:r>
-            <a:endParaRPr lang="en-US" dirty="0" smtClean="0"/>
           </a:p>
         </p:txBody>
       </p:sp>
@@ -5011,14 +4973,13 @@
               <a:t>(KNAUF DANOLINE A/S, </a:t>
             </a:r>
             <a:r>
-              <a:rPr lang="en-IE" sz="1000" dirty="0" err="1" smtClean="0"/>
+              <a:rPr lang="en-IE" sz="1000" dirty="0" err="1"/>
               <a:t>n.d.</a:t>
             </a:r>
             <a:r>
-              <a:rPr lang="en-IE" sz="1000" dirty="0" smtClean="0"/>
+              <a:rPr lang="en-IE" sz="1000" dirty="0"/>
               <a:t>)</a:t>
             </a:r>
-            <a:endParaRPr lang="en-IE" sz="1000" dirty="0"/>
           </a:p>
         </p:txBody>
       </p:sp>
@@ -5044,13 +5005,6 @@
       </p:transition>
     </mc:Fallback>
   </mc:AlternateContent>
-  <p:timing>
-    <p:tnLst>
-      <p:par>
-        <p:cTn id="1" dur="indefinite" restart="never" nodeType="tmRoot"/>
-      </p:par>
-    </p:tnLst>
-  </p:timing>
 </p:sld>
 </file>
 
@@ -5087,10 +5041,9 @@
           <a:lstStyle/>
           <a:p>
             <a:r>
-              <a:rPr lang="en-US" dirty="0" smtClean="0"/>
+              <a:rPr lang="en-US" dirty="0"/>
               <a:t>App Overview</a:t>
             </a:r>
-            <a:endParaRPr lang="en-US" dirty="0"/>
           </a:p>
         </p:txBody>
       </p:sp>
@@ -5112,56 +5065,73 @@
           <a:lstStyle/>
           <a:p>
             <a:r>
-              <a:rPr lang="en-US" dirty="0" smtClean="0"/>
+              <a:rPr lang="en-US" dirty="0"/>
               <a:t>What can the app do? </a:t>
             </a:r>
           </a:p>
           <a:p>
             <a:pPr lvl="1"/>
             <a:r>
-              <a:rPr lang="en-US" dirty="0" smtClean="0"/>
+              <a:rPr lang="en-US" dirty="0"/>
               <a:t>Sound input</a:t>
             </a:r>
           </a:p>
           <a:p>
             <a:pPr lvl="1"/>
             <a:r>
-              <a:rPr lang="en-US" dirty="0" smtClean="0"/>
-              <a:t>Determine the length of a sound</a:t>
+              <a:rPr lang="en-US" dirty="0"/>
+              <a:t>Determine the length of a sound until it </a:t>
+            </a:r>
+          </a:p>
+          <a:p>
+            <a:pPr marL="365760" lvl="1" indent="0">
+              <a:buNone/>
+            </a:pPr>
+            <a:r>
+              <a:rPr lang="en-US" dirty="0"/>
+              <a:t>disappears.</a:t>
             </a:r>
           </a:p>
           <a:p>
             <a:pPr lvl="1"/>
             <a:r>
-              <a:rPr lang="en-US" dirty="0" smtClean="0"/>
+              <a:rPr lang="en-US" dirty="0"/>
               <a:t>Calculate the correct reverb time</a:t>
             </a:r>
           </a:p>
           <a:p>
             <a:pPr lvl="1"/>
             <a:r>
-              <a:rPr lang="en-US" dirty="0" smtClean="0"/>
-              <a:t>Aid to generate high quality sound for recording.</a:t>
-            </a:r>
-            <a:endParaRPr lang="en-US" dirty="0" smtClean="0"/>
-          </a:p>
-          <a:p>
-            <a:r>
-              <a:rPr lang="en-US" dirty="0" smtClean="0"/>
+              <a:rPr lang="en-US" dirty="0"/>
+              <a:t>Aid to generate perfect acoustic environment</a:t>
+            </a:r>
+          </a:p>
+          <a:p>
+            <a:pPr marL="365760" lvl="1" indent="0">
+              <a:buNone/>
+            </a:pPr>
+            <a:r>
+              <a:rPr lang="en-US" dirty="0"/>
+              <a:t>for recording (acoustic treatment).</a:t>
+            </a:r>
+          </a:p>
+          <a:p>
+            <a:r>
+              <a:rPr lang="en-US" dirty="0"/>
               <a:t>What can’t the app do?</a:t>
             </a:r>
           </a:p>
           <a:p>
             <a:pPr lvl="1"/>
             <a:r>
-              <a:rPr lang="en-US" dirty="0" smtClean="0"/>
+              <a:rPr lang="en-US" dirty="0"/>
               <a:t>Tune instruments</a:t>
             </a:r>
           </a:p>
           <a:p>
             <a:pPr lvl="1"/>
             <a:r>
-              <a:rPr lang="en-US" dirty="0" smtClean="0"/>
+              <a:rPr lang="en-US" dirty="0"/>
               <a:t>Media player</a:t>
             </a:r>
           </a:p>
@@ -5225,18 +5195,10 @@
                   <a:srgbClr val="323232"/>
                 </a:solidFill>
               </a:rPr>
-              <a:t>(Mads Herring </a:t>
-            </a:r>
-            <a:r>
-              <a:rPr lang="en-IE" sz="1000" dirty="0" smtClean="0">
-                <a:solidFill>
-                  <a:srgbClr val="323232"/>
-                </a:solidFill>
-              </a:rPr>
-              <a:t>Jensen &amp; COMSOL </a:t>
-            </a:r>
-            <a:r>
-              <a:rPr lang="en-IE" sz="1000" dirty="0" err="1" smtClean="0">
+              <a:t>(Mads Herring Jensen &amp; COMSOL </a:t>
+            </a:r>
+            <a:r>
+              <a:rPr lang="en-IE" sz="1000" dirty="0" err="1">
                 <a:solidFill>
                   <a:srgbClr val="323232"/>
                 </a:solidFill>
@@ -5244,18 +5206,13 @@
               <a:t>Inc</a:t>
             </a:r>
             <a:r>
-              <a:rPr lang="en-IE" sz="1000" dirty="0" smtClean="0">
+              <a:rPr lang="en-IE" sz="1000" dirty="0">
                 <a:solidFill>
                   <a:srgbClr val="323232"/>
                 </a:solidFill>
               </a:rPr>
               <a:t>, 2015)</a:t>
             </a:r>
-            <a:endParaRPr lang="en-IE" sz="1000" dirty="0">
-              <a:solidFill>
-                <a:srgbClr val="323232"/>
-              </a:solidFill>
-            </a:endParaRPr>
           </a:p>
         </p:txBody>
       </p:sp>
@@ -5281,13 +5238,6 @@
       </p:transition>
     </mc:Fallback>
   </mc:AlternateContent>
-  <p:timing>
-    <p:tnLst>
-      <p:par>
-        <p:cTn id="1" dur="indefinite" restart="never" nodeType="tmRoot"/>
-      </p:par>
-    </p:tnLst>
-  </p:timing>
 </p:sld>
 </file>
 
@@ -5324,10 +5274,9 @@
           <a:lstStyle/>
           <a:p>
             <a:r>
-              <a:rPr lang="en-US" dirty="0" smtClean="0"/>
+              <a:rPr lang="en-US" dirty="0"/>
               <a:t>Progress on the Project</a:t>
             </a:r>
-            <a:endParaRPr lang="en-US" dirty="0"/>
           </a:p>
         </p:txBody>
       </p:sp>
@@ -5354,76 +5303,75 @@
           <a:lstStyle/>
           <a:p>
             <a:r>
-              <a:rPr lang="en-US" dirty="0" smtClean="0"/>
+              <a:rPr lang="en-US" dirty="0"/>
               <a:t>What has been done?</a:t>
             </a:r>
           </a:p>
           <a:p>
             <a:pPr lvl="1"/>
             <a:r>
-              <a:rPr lang="en-US" dirty="0" smtClean="0"/>
+              <a:rPr lang="en-US" dirty="0"/>
               <a:t>Proposal</a:t>
             </a:r>
           </a:p>
           <a:p>
             <a:pPr lvl="1"/>
             <a:r>
-              <a:rPr lang="en-US" dirty="0" smtClean="0"/>
+              <a:rPr lang="en-US" dirty="0"/>
               <a:t>Requirements</a:t>
             </a:r>
           </a:p>
           <a:p>
             <a:pPr lvl="1"/>
             <a:r>
-              <a:rPr lang="en-US" dirty="0" smtClean="0"/>
+              <a:rPr lang="en-US" dirty="0"/>
               <a:t>Android Studio - Tutorials</a:t>
             </a:r>
           </a:p>
           <a:p>
             <a:r>
-              <a:rPr lang="en-US" dirty="0" smtClean="0"/>
+              <a:rPr lang="en-US" dirty="0"/>
               <a:t>What is happening now?</a:t>
             </a:r>
           </a:p>
           <a:p>
             <a:pPr lvl="1"/>
             <a:r>
-              <a:rPr lang="en-US" dirty="0" smtClean="0"/>
+              <a:rPr lang="en-US" dirty="0"/>
               <a:t>Android Studio – coding</a:t>
             </a:r>
-            <a:endParaRPr lang="en-US" dirty="0"/>
-          </a:p>
-          <a:p>
-            <a:r>
-              <a:rPr lang="en-US" dirty="0" smtClean="0"/>
+          </a:p>
+          <a:p>
+            <a:r>
+              <a:rPr lang="en-US" dirty="0"/>
               <a:t>What is next?</a:t>
             </a:r>
           </a:p>
           <a:p>
             <a:pPr lvl="1"/>
             <a:r>
-              <a:rPr lang="en-US" dirty="0" smtClean="0"/>
+              <a:rPr lang="en-US" dirty="0"/>
               <a:t>Android Studio – more coding</a:t>
             </a:r>
           </a:p>
           <a:p>
             <a:pPr lvl="1"/>
             <a:r>
-              <a:rPr lang="en-US" dirty="0" smtClean="0"/>
+              <a:rPr lang="en-US" dirty="0"/>
               <a:t>Testing</a:t>
             </a:r>
           </a:p>
           <a:p>
             <a:pPr lvl="1"/>
             <a:r>
-              <a:rPr lang="en-US" dirty="0" smtClean="0"/>
+              <a:rPr lang="en-US" dirty="0"/>
               <a:t>Implementation</a:t>
             </a:r>
           </a:p>
           <a:p>
             <a:pPr lvl="1"/>
             <a:r>
-              <a:rPr lang="en-US" dirty="0" smtClean="0"/>
+              <a:rPr lang="en-US" dirty="0"/>
               <a:t>Final submission</a:t>
             </a:r>
           </a:p>
@@ -5452,31 +5400,26 @@
           <a:p>
             <a:pPr lvl="0" algn="ctr"/>
             <a:r>
-              <a:rPr lang="en-IE" sz="1000" dirty="0" smtClean="0">
+              <a:rPr lang="en-IE" sz="1000" dirty="0">
                 <a:solidFill>
                   <a:srgbClr val="323232"/>
                 </a:solidFill>
               </a:rPr>
               <a:t>(Software Plant, 2017)</a:t>
             </a:r>
-            <a:endParaRPr lang="en-IE" sz="1000" dirty="0">
-              <a:solidFill>
-                <a:srgbClr val="323232"/>
-              </a:solidFill>
-            </a:endParaRPr>
           </a:p>
         </p:txBody>
       </p:sp>
       <p:pic>
         <p:nvPicPr>
-          <p:cNvPr id="2" name="Picture 1"/>
+          <p:cNvPr id="4" name="Picture 3"/>
           <p:cNvPicPr>
             <a:picLocks noChangeAspect="1"/>
           </p:cNvPicPr>
           <p:nvPr/>
         </p:nvPicPr>
         <p:blipFill>
-          <a:blip r:embed="rId2" cstate="print">
+          <a:blip r:embed="rId2">
             <a:extLst>
               <a:ext uri="{28A0092B-C50C-407E-A947-70E740481C1C}">
                 <a14:useLocalDpi xmlns:a14="http://schemas.microsoft.com/office/drawing/2010/main" val="0"/>
@@ -5489,8 +5432,8 @@
         </p:blipFill>
         <p:spPr>
           <a:xfrm>
-            <a:off x="6373752" y="1623719"/>
-            <a:ext cx="5416514" cy="3928056"/>
+            <a:off x="5561550" y="1901952"/>
+            <a:ext cx="6385730" cy="3448655"/>
           </a:xfrm>
           <a:prstGeom prst="rect">
             <a:avLst/>
@@ -5519,13 +5462,6 @@
       </p:transition>
     </mc:Fallback>
   </mc:AlternateContent>
-  <p:timing>
-    <p:tnLst>
-      <p:par>
-        <p:cTn id="1" dur="indefinite" restart="never" nodeType="tmRoot"/>
-      </p:par>
-    </p:tnLst>
-  </p:timing>
 </p:sld>
 </file>
 
@@ -5562,10 +5498,9 @@
           <a:lstStyle/>
           <a:p>
             <a:r>
-              <a:rPr lang="en-US" dirty="0" smtClean="0"/>
+              <a:rPr lang="en-US" dirty="0"/>
               <a:t>Demonstration of the App</a:t>
             </a:r>
-            <a:endParaRPr lang="en-US" dirty="0"/>
           </a:p>
         </p:txBody>
       </p:sp>
@@ -5610,13 +5545,6 @@
       </p:transition>
     </mc:Fallback>
   </mc:AlternateContent>
-  <p:timing>
-    <p:tnLst>
-      <p:par>
-        <p:cTn id="1" dur="indefinite" restart="never" nodeType="tmRoot"/>
-      </p:par>
-    </p:tnLst>
-  </p:timing>
 </p:sld>
 </file>
 
@@ -5653,10 +5581,9 @@
           <a:lstStyle/>
           <a:p>
             <a:r>
-              <a:rPr lang="en-US" dirty="0" smtClean="0"/>
+              <a:rPr lang="en-US" dirty="0"/>
               <a:t>References</a:t>
             </a:r>
-            <a:endParaRPr lang="en-US" dirty="0"/>
           </a:p>
         </p:txBody>
       </p:sp>
@@ -5682,88 +5609,19 @@
           <a:p>
             <a:r>
               <a:rPr lang="de-DE" dirty="0"/>
-              <a:t>KNAUF DANOLINE A/S, n.d</a:t>
-            </a:r>
-            <a:r>
-              <a:rPr lang="de-DE" dirty="0" smtClean="0"/>
-              <a:t>., image, </a:t>
-            </a:r>
+              <a:t>KNAUF DANOLINE A/S, n.d., image, viewed March 2017, &lt;http://knaufdanoline.com/properties/acoustics/&gt;.</a:t>
+            </a:r>
+          </a:p>
+          <a:p>
             <a:r>
               <a:rPr lang="de-DE" dirty="0"/>
-              <a:t>viewed </a:t>
-            </a:r>
-            <a:r>
-              <a:rPr lang="de-DE" dirty="0" smtClean="0"/>
-              <a:t>March 2017</a:t>
-            </a:r>
+              <a:t>Mads Herring Jensen &amp; COMSOL Inc, 2015, image, viewed March 2017, &lt;https://www.comsol.com/blogs/modeling-room-acoustics-with-comsol-multiphysics/&gt;.</a:t>
+            </a:r>
+          </a:p>
+          <a:p>
             <a:r>
               <a:rPr lang="de-DE" dirty="0"/>
-              <a:t>, </a:t>
-            </a:r>
-            <a:r>
-              <a:rPr lang="de-DE" dirty="0" smtClean="0"/>
-              <a:t>&lt;http</a:t>
-            </a:r>
-            <a:r>
-              <a:rPr lang="de-DE" dirty="0"/>
-              <a:t>://knaufdanoline.com/properties/acoustics</a:t>
-            </a:r>
-            <a:r>
-              <a:rPr lang="de-DE" dirty="0" smtClean="0"/>
-              <a:t>/&gt;.</a:t>
-            </a:r>
-          </a:p>
-          <a:p>
-            <a:r>
-              <a:rPr lang="de-DE" dirty="0"/>
-              <a:t>Mads Herring Jensen &amp; COMSOL Inc, </a:t>
-            </a:r>
-            <a:r>
-              <a:rPr lang="de-DE" dirty="0" smtClean="0"/>
-              <a:t>2015, image</a:t>
-            </a:r>
-            <a:r>
-              <a:rPr lang="de-DE" dirty="0"/>
-              <a:t>, viewed March 2017, </a:t>
-            </a:r>
-            <a:r>
-              <a:rPr lang="de-DE" dirty="0" smtClean="0"/>
-              <a:t>&lt;https</a:t>
-            </a:r>
-            <a:r>
-              <a:rPr lang="de-DE" dirty="0"/>
-              <a:t>://www.comsol.com/blogs/modeling-room-acoustics-with-comsol-multiphysics</a:t>
-            </a:r>
-            <a:r>
-              <a:rPr lang="de-DE" dirty="0" smtClean="0"/>
-              <a:t>/&gt;.</a:t>
-            </a:r>
-            <a:endParaRPr lang="de-DE" dirty="0"/>
-          </a:p>
-          <a:p>
-            <a:r>
-              <a:rPr lang="de-DE" dirty="0"/>
-              <a:t>Software Plant, </a:t>
-            </a:r>
-            <a:r>
-              <a:rPr lang="de-DE" dirty="0" smtClean="0"/>
-              <a:t>2017, image</a:t>
-            </a:r>
-            <a:r>
-              <a:rPr lang="de-DE" dirty="0"/>
-              <a:t>, viewed March 2017, </a:t>
-            </a:r>
-            <a:r>
-              <a:rPr lang="de-DE" dirty="0" smtClean="0"/>
-              <a:t>&lt;http</a:t>
-            </a:r>
-            <a:r>
-              <a:rPr lang="de-DE" dirty="0"/>
-              <a:t>://www.softwareplant.com/migrating-ms-project-jira</a:t>
-            </a:r>
-            <a:r>
-              <a:rPr lang="de-DE" dirty="0" smtClean="0"/>
-              <a:t>/&gt;.</a:t>
+              <a:t>Software Plant, 2017, image, viewed March 2017, &lt;http://www.softwareplant.com/migrating-ms-project-jira/&gt;.</a:t>
             </a:r>
           </a:p>
           <a:p>
@@ -5774,23 +5632,11 @@
                   <a:srgbClr val="323232"/>
                 </a:solidFill>
               </a:rPr>
-              <a:t>canadian1strealty, </a:t>
-            </a:r>
-            <a:r>
-              <a:rPr lang="en-IE" dirty="0" smtClean="0">
-                <a:solidFill>
-                  <a:srgbClr val="323232"/>
-                </a:solidFill>
-              </a:rPr>
-              <a:t>2012</a:t>
-            </a:r>
-            <a:r>
-              <a:rPr lang="de-DE" dirty="0" smtClean="0"/>
-              <a:t>, photograph, </a:t>
+              <a:t>canadian1strealty, 2012</a:t>
             </a:r>
             <a:r>
               <a:rPr lang="de-DE" dirty="0"/>
-              <a:t>viewed March 2017, &lt;https://canadian1strealty.wordpress.com/2012/11/13/5-nice-things-we-can-do-for-our-clients/</a:t>
+              <a:t>, photograph, viewed March 2017, &lt;https://canadian1strealty.wordpress.com/2012/11/13/5-nice-things-we-can-do-for-our-clients/</a:t>
             </a:r>
           </a:p>
           <a:p>
@@ -5820,13 +5666,6 @@
       </p:transition>
     </mc:Fallback>
   </mc:AlternateContent>
-  <p:timing>
-    <p:tnLst>
-      <p:par>
-        <p:cTn id="1" dur="indefinite" restart="never" nodeType="tmRoot"/>
-      </p:par>
-    </p:tnLst>
-  </p:timing>
 </p:sld>
 </file>
 
@@ -5866,7 +5705,6 @@
               <a:rPr lang="en-US" dirty="0"/>
               <a:t>Audio Acoustic Assistant</a:t>
             </a:r>
-            <a:endParaRPr lang="en-US" dirty="0"/>
           </a:p>
         </p:txBody>
       </p:sp>
@@ -5914,17 +5752,6 @@
           <a:p>
             <a:pPr lvl="0"/>
             <a:r>
-              <a:rPr lang="en-US" dirty="0" smtClean="0">
-                <a:solidFill>
-                  <a:srgbClr val="323232">
-                    <a:lumMod val="90000"/>
-                    <a:lumOff val="10000"/>
-                  </a:srgbClr>
-                </a:solidFill>
-              </a:rPr>
-              <a:t>Colin </a:t>
-            </a:r>
-            <a:r>
               <a:rPr lang="en-US" dirty="0">
                 <a:solidFill>
                   <a:srgbClr val="323232">
@@ -5933,7 +5760,7 @@
                   </a:srgbClr>
                 </a:solidFill>
               </a:rPr>
-              <a:t>Allen,</a:t>
+              <a:t>Colin Allen,</a:t>
             </a:r>
           </a:p>
           <a:p>
@@ -6025,21 +5852,8 @@
                   <a:srgbClr val="323232"/>
                 </a:solidFill>
               </a:rPr>
-              <a:t>(canadian1strealty, </a:t>
-            </a:r>
-            <a:r>
-              <a:rPr lang="en-IE" sz="1000" dirty="0" smtClean="0">
-                <a:solidFill>
-                  <a:srgbClr val="323232"/>
-                </a:solidFill>
-              </a:rPr>
-              <a:t>2012)</a:t>
-            </a:r>
-            <a:endParaRPr lang="en-IE" sz="1000" dirty="0">
-              <a:solidFill>
-                <a:srgbClr val="323232"/>
-              </a:solidFill>
-            </a:endParaRPr>
+              <a:t>(canadian1strealty, 2012)</a:t>
+            </a:r>
           </a:p>
         </p:txBody>
       </p:sp>
@@ -6065,13 +5879,6 @@
       </p:transition>
     </mc:Fallback>
   </mc:AlternateContent>
-  <p:timing>
-    <p:tnLst>
-      <p:par>
-        <p:cTn id="1" dur="indefinite" restart="never" nodeType="tmRoot"/>
-      </p:par>
-    </p:tnLst>
-  </p:timing>
 </p:sld>
 </file>
 

</xml_diff>

<commit_message>
Added WBS as full slide
</commit_message>
<xml_diff>
--- a/PowerPoint presentation.pptx
+++ b/PowerPoint presentation.pptx
@@ -5,10 +5,10 @@
     <p:sldMasterId id="2147483648" r:id="rId2"/>
   </p:sldMasterIdLst>
   <p:notesMasterIdLst>
-    <p:notesMasterId r:id="rId10"/>
+    <p:notesMasterId r:id="rId11"/>
   </p:notesMasterIdLst>
   <p:handoutMasterIdLst>
-    <p:handoutMasterId r:id="rId11"/>
+    <p:handoutMasterId r:id="rId12"/>
   </p:handoutMasterIdLst>
   <p:sldIdLst>
     <p:sldId id="256" r:id="rId3"/>
@@ -16,8 +16,9 @@
     <p:sldId id="271" r:id="rId5"/>
     <p:sldId id="272" r:id="rId6"/>
     <p:sldId id="257" r:id="rId7"/>
-    <p:sldId id="267" r:id="rId8"/>
-    <p:sldId id="270" r:id="rId9"/>
+    <p:sldId id="273" r:id="rId8"/>
+    <p:sldId id="267" r:id="rId9"/>
+    <p:sldId id="270" r:id="rId10"/>
   </p:sldIdLst>
   <p:sldSz cx="12192000" cy="6858000"/>
   <p:notesSz cx="6858000" cy="9144000"/>
@@ -717,7 +718,7 @@
           <a:p>
             <a:fld id="{3EBA5BD7-F043-4D1B-AA17-CD412FC534DE}" type="slidenum">
               <a:rPr lang="en-US" smtClean="0"/>
-              <a:t>6</a:t>
+              <a:t>7</a:t>
             </a:fld>
             <a:endParaRPr lang="en-US"/>
           </a:p>
@@ -5057,7 +5058,12 @@
             <p:ph idx="1"/>
           </p:nvPr>
         </p:nvSpPr>
-        <p:spPr/>
+        <p:spPr>
+          <a:xfrm>
+            <a:off x="800207" y="1956937"/>
+            <a:ext cx="9509760" cy="4127627"/>
+          </a:xfrm>
+        </p:spPr>
         <p:txBody>
           <a:bodyPr>
             <a:normAutofit/>
@@ -5082,14 +5088,13 @@
               <a:rPr lang="en-US" dirty="0"/>
               <a:t>Determine the length of a sound until it </a:t>
             </a:r>
-          </a:p>
-          <a:p>
-            <a:pPr marL="365760" lvl="1" indent="0">
-              <a:buNone/>
-            </a:pPr>
+            <a:r>
+              <a:rPr lang="en-US" dirty="0" smtClean="0"/>
+              <a:t> disappears</a:t>
+            </a:r>
             <a:r>
               <a:rPr lang="en-US" dirty="0"/>
-              <a:t>disappears.</a:t>
+              <a:t>.</a:t>
             </a:r>
           </a:p>
           <a:p>
@@ -5410,36 +5415,6 @@
           </a:p>
         </p:txBody>
       </p:sp>
-      <p:pic>
-        <p:nvPicPr>
-          <p:cNvPr id="4" name="Picture 3"/>
-          <p:cNvPicPr>
-            <a:picLocks noChangeAspect="1"/>
-          </p:cNvPicPr>
-          <p:nvPr/>
-        </p:nvPicPr>
-        <p:blipFill>
-          <a:blip r:embed="rId2">
-            <a:extLst>
-              <a:ext uri="{28A0092B-C50C-407E-A947-70E740481C1C}">
-                <a14:useLocalDpi xmlns:a14="http://schemas.microsoft.com/office/drawing/2010/main" val="0"/>
-              </a:ext>
-            </a:extLst>
-          </a:blip>
-          <a:stretch>
-            <a:fillRect/>
-          </a:stretch>
-        </p:blipFill>
-        <p:spPr>
-          <a:xfrm>
-            <a:off x="5561550" y="1901952"/>
-            <a:ext cx="6385730" cy="3448655"/>
-          </a:xfrm>
-          <a:prstGeom prst="rect">
-            <a:avLst/>
-          </a:prstGeom>
-        </p:spPr>
-      </p:pic>
     </p:spTree>
     <p:extLst>
       <p:ext uri="{BB962C8B-B14F-4D97-AF65-F5344CB8AC3E}">
@@ -5492,34 +5467,97 @@
             <p:ph type="title"/>
           </p:nvPr>
         </p:nvSpPr>
-        <p:spPr/>
+        <p:spPr>
+          <a:xfrm>
+            <a:off x="91869" y="-616712"/>
+            <a:ext cx="9509760" cy="1233424"/>
+          </a:xfrm>
+        </p:spPr>
         <p:txBody>
           <a:bodyPr/>
           <a:lstStyle/>
           <a:p>
             <a:r>
-              <a:rPr lang="en-US" dirty="0"/>
-              <a:t>Demonstration of the App</a:t>
-            </a:r>
-          </a:p>
-        </p:txBody>
-      </p:sp>
-      <p:sp>
-        <p:nvSpPr>
-          <p:cNvPr id="2" name="Content Placeholder 1"/>
-          <p:cNvSpPr>
-            <a:spLocks noGrp="1"/>
-          </p:cNvSpPr>
-          <p:nvPr>
-            <p:ph idx="1"/>
-          </p:nvPr>
-        </p:nvSpPr>
-        <p:spPr/>
-        <p:txBody>
-          <a:bodyPr/>
+              <a:rPr lang="en-US" dirty="0" smtClean="0"/>
+              <a:t>Work Breakdown Structure</a:t>
+            </a:r>
+            <a:endParaRPr lang="en-US" dirty="0"/>
+          </a:p>
+        </p:txBody>
+      </p:sp>
+      <p:pic>
+        <p:nvPicPr>
+          <p:cNvPr id="4" name="Picture 3"/>
+          <p:cNvPicPr>
+            <a:picLocks noChangeAspect="1"/>
+          </p:cNvPicPr>
+          <p:nvPr/>
+        </p:nvPicPr>
+        <p:blipFill>
+          <a:blip r:embed="rId2">
+            <a:extLst>
+              <a:ext uri="{28A0092B-C50C-407E-A947-70E740481C1C}">
+                <a14:useLocalDpi xmlns:a14="http://schemas.microsoft.com/office/drawing/2010/main" val="0"/>
+              </a:ext>
+            </a:extLst>
+          </a:blip>
+          <a:stretch>
+            <a:fillRect/>
+          </a:stretch>
+        </p:blipFill>
+        <p:spPr>
+          <a:xfrm>
+            <a:off x="244699" y="616712"/>
+            <a:ext cx="10994243" cy="5937512"/>
+          </a:xfrm>
+          <a:prstGeom prst="rect">
+            <a:avLst/>
+          </a:prstGeom>
+        </p:spPr>
+      </p:pic>
+      <p:sp>
+        <p:nvSpPr>
+          <p:cNvPr id="5" name="Rectangle 4"/>
+          <p:cNvSpPr/>
+          <p:nvPr/>
+        </p:nvSpPr>
+        <p:spPr>
+          <a:xfrm>
+            <a:off x="7985902" y="6611779"/>
+            <a:ext cx="2401619" cy="246221"/>
+          </a:xfrm>
+          <a:prstGeom prst="rect">
+            <a:avLst/>
+          </a:prstGeom>
+        </p:spPr>
+        <p:txBody>
+          <a:bodyPr wrap="none">
+            <a:spAutoFit/>
+          </a:bodyPr>
           <a:lstStyle/>
           <a:p>
-            <a:endParaRPr lang="en-IE"/>
+            <a:pPr lvl="0" algn="ctr"/>
+            <a:r>
+              <a:rPr lang="en-IE" sz="1000" dirty="0" smtClean="0">
+                <a:solidFill>
+                  <a:srgbClr val="323232"/>
+                </a:solidFill>
+              </a:rPr>
+              <a:t>Used with permission </a:t>
+            </a:r>
+            <a:r>
+              <a:rPr lang="en-IE" sz="1000" smtClean="0">
+                <a:solidFill>
+                  <a:srgbClr val="323232"/>
+                </a:solidFill>
+              </a:rPr>
+              <a:t>from Microsoft.</a:t>
+            </a:r>
+            <a:endParaRPr lang="en-IE" sz="1000" dirty="0">
+              <a:solidFill>
+                <a:srgbClr val="323232"/>
+              </a:solidFill>
+            </a:endParaRPr>
           </a:p>
         </p:txBody>
       </p:sp>
@@ -5567,6 +5605,89 @@
       </p:grpSpPr>
       <p:sp>
         <p:nvSpPr>
+          <p:cNvPr id="6" name="Title 5"/>
+          <p:cNvSpPr>
+            <a:spLocks noGrp="1"/>
+          </p:cNvSpPr>
+          <p:nvPr>
+            <p:ph type="title"/>
+          </p:nvPr>
+        </p:nvSpPr>
+        <p:spPr/>
+        <p:txBody>
+          <a:bodyPr/>
+          <a:lstStyle/>
+          <a:p>
+            <a:r>
+              <a:rPr lang="en-US" dirty="0"/>
+              <a:t>Demonstration of the App</a:t>
+            </a:r>
+          </a:p>
+        </p:txBody>
+      </p:sp>
+      <p:sp>
+        <p:nvSpPr>
+          <p:cNvPr id="2" name="Content Placeholder 1"/>
+          <p:cNvSpPr>
+            <a:spLocks noGrp="1"/>
+          </p:cNvSpPr>
+          <p:nvPr>
+            <p:ph idx="1"/>
+          </p:nvPr>
+        </p:nvSpPr>
+        <p:spPr/>
+        <p:txBody>
+          <a:bodyPr/>
+          <a:lstStyle/>
+          <a:p>
+            <a:endParaRPr lang="en-IE"/>
+          </a:p>
+        </p:txBody>
+      </p:sp>
+    </p:spTree>
+    <p:extLst>
+      <p:ext uri="{BB962C8B-B14F-4D97-AF65-F5344CB8AC3E}">
+        <p14:creationId xmlns:p14="http://schemas.microsoft.com/office/powerpoint/2010/main" val="440609444"/>
+      </p:ext>
+    </p:extLst>
+  </p:cSld>
+  <p:clrMapOvr>
+    <a:masterClrMapping/>
+  </p:clrMapOvr>
+  <mc:AlternateContent xmlns:mc="http://schemas.openxmlformats.org/markup-compatibility/2006" xmlns:p14="http://schemas.microsoft.com/office/powerpoint/2010/main">
+    <mc:Choice Requires="p14">
+      <p:transition spd="med" p14:dur="700">
+        <p:fade/>
+      </p:transition>
+    </mc:Choice>
+    <mc:Fallback xmlns="">
+      <p:transition spd="med">
+        <p:fade/>
+      </p:transition>
+    </mc:Fallback>
+  </mc:AlternateContent>
+</p:sld>
+</file>
+
+<file path=ppt/slides/slide7.xml><?xml version="1.0" encoding="utf-8"?>
+<p:sld xmlns:a="http://schemas.openxmlformats.org/drawingml/2006/main" xmlns:r="http://schemas.openxmlformats.org/officeDocument/2006/relationships" xmlns:p="http://schemas.openxmlformats.org/presentationml/2006/main">
+  <p:cSld>
+    <p:spTree>
+      <p:nvGrpSpPr>
+        <p:cNvPr id="1" name=""/>
+        <p:cNvGrpSpPr/>
+        <p:nvPr/>
+      </p:nvGrpSpPr>
+      <p:grpSpPr>
+        <a:xfrm>
+          <a:off x="0" y="0"/>
+          <a:ext cx="0" cy="0"/>
+          <a:chOff x="0" y="0"/>
+          <a:chExt cx="0" cy="0"/>
+        </a:xfrm>
+      </p:grpSpPr>
+      <p:sp>
+        <p:nvSpPr>
           <p:cNvPr id="2" name="Title 1"/>
           <p:cNvSpPr>
             <a:spLocks noGrp="1"/>
@@ -5676,7 +5797,7 @@
 </p:sld>
 </file>
 
-<file path=ppt/slides/slide7.xml><?xml version="1.0" encoding="utf-8"?>
+<file path=ppt/slides/slide8.xml><?xml version="1.0" encoding="utf-8"?>
 <p:sld xmlns:a="http://schemas.openxmlformats.org/drawingml/2006/main" xmlns:r="http://schemas.openxmlformats.org/officeDocument/2006/relationships" xmlns:p="http://schemas.openxmlformats.org/presentationml/2006/main">
   <p:cSld>
     <p:spTree>

</xml_diff>

<commit_message>
re-added image in Presentation
</commit_message>
<xml_diff>
--- a/PowerPoint presentation.pptx
+++ b/PowerPoint presentation.pptx
@@ -5415,6 +5415,36 @@
           </a:p>
         </p:txBody>
       </p:sp>
+      <p:pic>
+        <p:nvPicPr>
+          <p:cNvPr id="2" name="Picture 1"/>
+          <p:cNvPicPr>
+            <a:picLocks noChangeAspect="1"/>
+          </p:cNvPicPr>
+          <p:nvPr/>
+        </p:nvPicPr>
+        <p:blipFill>
+          <a:blip r:embed="rId2">
+            <a:extLst>
+              <a:ext uri="{28A0092B-C50C-407E-A947-70E740481C1C}">
+                <a14:useLocalDpi xmlns:a14="http://schemas.microsoft.com/office/drawing/2010/main" val="0"/>
+              </a:ext>
+            </a:extLst>
+          </a:blip>
+          <a:stretch>
+            <a:fillRect/>
+          </a:stretch>
+        </p:blipFill>
+        <p:spPr>
+          <a:xfrm>
+            <a:off x="6300002" y="1619855"/>
+            <a:ext cx="5413248" cy="3931920"/>
+          </a:xfrm>
+          <a:prstGeom prst="rect">
+            <a:avLst/>
+          </a:prstGeom>
+        </p:spPr>
+      </p:pic>
     </p:spTree>
     <p:extLst>
       <p:ext uri="{BB962C8B-B14F-4D97-AF65-F5344CB8AC3E}">

</xml_diff>